<commit_message>
Remove data storage for FSM, add first slides to presentation
</commit_message>
<xml_diff>
--- a/assets/camozzi_presentation_20220111.pptx
+++ b/assets/camozzi_presentation_20220111.pptx
@@ -5,14 +5,18 @@
     <p:sldMasterId id="2147483648" r:id="rId4"/>
   </p:sldMasterIdLst>
   <p:notesMasterIdLst>
-    <p:notesMasterId r:id="rId7"/>
+    <p:notesMasterId r:id="rId11"/>
   </p:notesMasterIdLst>
   <p:handoutMasterIdLst>
-    <p:handoutMasterId r:id="rId8"/>
+    <p:handoutMasterId r:id="rId12"/>
   </p:handoutMasterIdLst>
   <p:sldIdLst>
     <p:sldId id="256" r:id="rId5"/>
     <p:sldId id="328" r:id="rId6"/>
+    <p:sldId id="329" r:id="rId7"/>
+    <p:sldId id="330" r:id="rId8"/>
+    <p:sldId id="331" r:id="rId9"/>
+    <p:sldId id="332" r:id="rId10"/>
   </p:sldIdLst>
   <p:sldSz cx="12192000" cy="6858000"/>
   <p:notesSz cx="6858000" cy="9144000"/>
@@ -112,6 +116,24 @@
     </a:lvl9pPr>
   </p:defaultTextStyle>
   <p:extLst>
+    <p:ext uri="{521415D9-36F7-43E2-AB2F-B90AF26B5E84}">
+      <p14:sectionLst xmlns:p14="http://schemas.microsoft.com/office/powerpoint/2010/main">
+        <p14:section name="Default Section" id="{CF00D123-BBF5-474C-B31D-16FA05BF56A2}">
+          <p14:sldIdLst>
+            <p14:sldId id="256"/>
+          </p14:sldIdLst>
+        </p14:section>
+        <p14:section name="Untitled Section" id="{5814547E-D3BD-4D1C-A39D-4D10EF260DE3}">
+          <p14:sldIdLst>
+            <p14:sldId id="328"/>
+            <p14:sldId id="329"/>
+            <p14:sldId id="330"/>
+            <p14:sldId id="331"/>
+            <p14:sldId id="332"/>
+          </p14:sldIdLst>
+        </p14:section>
+      </p14:sectionLst>
+    </p:ext>
     <p:ext uri="{EFAFB233-063F-42B5-8137-9DF3F51BA10A}">
       <p15:sldGuideLst xmlns:p15="http://schemas.microsoft.com/office/powerpoint/2012/main">
         <p15:guide id="1" orient="horz" pos="2160" userDrawn="1">
@@ -698,6 +720,90 @@
     </a:lvl9pPr>
   </p:notesStyle>
 </p:notesMaster>
+</file>
+
+<file path=ppt/notesSlides/notesSlide1.xml><?xml version="1.0" encoding="utf-8"?>
+<p:notes xmlns:a="http://schemas.openxmlformats.org/drawingml/2006/main" xmlns:r="http://schemas.openxmlformats.org/officeDocument/2006/relationships" xmlns:p="http://schemas.openxmlformats.org/presentationml/2006/main">
+  <p:cSld>
+    <p:spTree>
+      <p:nvGrpSpPr>
+        <p:cNvPr id="1" name=""/>
+        <p:cNvGrpSpPr/>
+        <p:nvPr/>
+      </p:nvGrpSpPr>
+      <p:grpSpPr>
+        <a:xfrm>
+          <a:off x="0" y="0"/>
+          <a:ext cx="0" cy="0"/>
+          <a:chOff x="0" y="0"/>
+          <a:chExt cx="0" cy="0"/>
+        </a:xfrm>
+      </p:grpSpPr>
+      <p:sp>
+        <p:nvSpPr>
+          <p:cNvPr id="2" name="Slide Image Placeholder 1"/>
+          <p:cNvSpPr>
+            <a:spLocks noGrp="1" noRot="1" noChangeAspect="1"/>
+          </p:cNvSpPr>
+          <p:nvPr>
+            <p:ph type="sldImg"/>
+          </p:nvPr>
+        </p:nvSpPr>
+        <p:spPr/>
+      </p:sp>
+      <p:sp>
+        <p:nvSpPr>
+          <p:cNvPr id="3" name="Notes Placeholder 2"/>
+          <p:cNvSpPr>
+            <a:spLocks noGrp="1"/>
+          </p:cNvSpPr>
+          <p:nvPr>
+            <p:ph type="body" idx="1"/>
+          </p:nvPr>
+        </p:nvSpPr>
+        <p:spPr/>
+        <p:txBody>
+          <a:bodyPr/>
+          <a:lstStyle/>
+          <a:p>
+            <a:endParaRPr lang="en-US" dirty="0"/>
+          </a:p>
+        </p:txBody>
+      </p:sp>
+      <p:sp>
+        <p:nvSpPr>
+          <p:cNvPr id="4" name="Slide Number Placeholder 3"/>
+          <p:cNvSpPr>
+            <a:spLocks noGrp="1"/>
+          </p:cNvSpPr>
+          <p:nvPr>
+            <p:ph type="sldNum" sz="quarter" idx="10"/>
+          </p:nvPr>
+        </p:nvSpPr>
+        <p:spPr/>
+        <p:txBody>
+          <a:bodyPr/>
+          <a:lstStyle/>
+          <a:p>
+            <a:fld id="{BEAE1C33-52CC-4E9F-95BF-495EBC1CF6B4}" type="slidenum">
+              <a:rPr lang="en-US" smtClean="0"/>
+              <a:t>2</a:t>
+            </a:fld>
+            <a:endParaRPr lang="en-US"/>
+          </a:p>
+        </p:txBody>
+      </p:sp>
+    </p:spTree>
+    <p:extLst>
+      <p:ext uri="{BB962C8B-B14F-4D97-AF65-F5344CB8AC3E}">
+        <p14:creationId xmlns:p14="http://schemas.microsoft.com/office/powerpoint/2010/main" val="2695579606"/>
+      </p:ext>
+    </p:extLst>
+  </p:cSld>
+  <p:clrMapOvr>
+    <a:masterClrMapping/>
+  </p:clrMapOvr>
+</p:notes>
 </file>
 
 <file path=ppt/slideLayouts/slideLayout1.xml><?xml version="1.0" encoding="utf-8"?>
@@ -1190,8 +1296,8 @@
         </p:nvSpPr>
         <p:spPr>
           <a:xfrm>
-            <a:off x="1351720" y="3013501"/>
-            <a:ext cx="9488560" cy="830997"/>
+            <a:off x="1162760" y="3013501"/>
+            <a:ext cx="9866484" cy="830997"/>
           </a:xfrm>
           <a:prstGeom prst="rect">
             <a:avLst/>
@@ -1211,7 +1317,15 @@
                   <a:srgbClr val="0070C0"/>
                 </a:solidFill>
               </a:rPr>
-              <a:t>FT sensors: a case study for </a:t>
+              <a:t>FT sensors: </a:t>
+            </a:r>
+            <a:r>
+              <a:rPr lang="en-US" sz="4800" b="1" dirty="0" smtClean="0">
+                <a:solidFill>
+                  <a:srgbClr val="0070C0"/>
+                </a:solidFill>
+              </a:rPr>
+              <a:t>an application for </a:t>
             </a:r>
             <a:r>
               <a:rPr lang="en-US" sz="4800" b="1" dirty="0" err="1" smtClean="0">
@@ -1259,6 +1373,164 @@
           <a:chExt cx="0" cy="0"/>
         </a:xfrm>
       </p:grpSpPr>
+      <p:sp>
+        <p:nvSpPr>
+          <p:cNvPr id="2" name="TextBox 1">
+            <a:extLst>
+              <a:ext uri="{FF2B5EF4-FFF2-40B4-BE49-F238E27FC236}">
+                <a16:creationId xmlns:a16="http://schemas.microsoft.com/office/drawing/2014/main" id="{E5263714-2E5E-4493-BEE6-6BC5D1695698}"/>
+              </a:ext>
+            </a:extLst>
+          </p:cNvPr>
+          <p:cNvSpPr txBox="1"/>
+          <p:nvPr/>
+        </p:nvSpPr>
+        <p:spPr>
+          <a:xfrm>
+            <a:off x="4788238" y="0"/>
+            <a:ext cx="2615524" cy="830997"/>
+          </a:xfrm>
+          <a:prstGeom prst="rect">
+            <a:avLst/>
+          </a:prstGeom>
+          <a:noFill/>
+        </p:spPr>
+        <p:txBody>
+          <a:bodyPr wrap="none" rtlCol="0">
+            <a:spAutoFit/>
+          </a:bodyPr>
+          <a:lstStyle/>
+          <a:p>
+            <a:pPr algn="ctr"/>
+            <a:r>
+              <a:rPr lang="en-US" sz="4800" b="1" dirty="0" smtClean="0">
+                <a:solidFill>
+                  <a:srgbClr val="0070C0"/>
+                </a:solidFill>
+              </a:rPr>
+              <a:t>Objective</a:t>
+            </a:r>
+            <a:endParaRPr lang="en-US" sz="4800" b="1" dirty="0">
+              <a:solidFill>
+                <a:srgbClr val="0070C0"/>
+              </a:solidFill>
+            </a:endParaRPr>
+          </a:p>
+        </p:txBody>
+      </p:sp>
+      <p:sp>
+        <p:nvSpPr>
+          <p:cNvPr id="3" name="TextBox 2"/>
+          <p:cNvSpPr txBox="1"/>
+          <p:nvPr/>
+        </p:nvSpPr>
+        <p:spPr>
+          <a:xfrm>
+            <a:off x="256674" y="1355558"/>
+            <a:ext cx="11389894" cy="3323987"/>
+          </a:xfrm>
+          <a:prstGeom prst="rect">
+            <a:avLst/>
+          </a:prstGeom>
+          <a:noFill/>
+        </p:spPr>
+        <p:txBody>
+          <a:bodyPr wrap="square" rtlCol="0">
+            <a:spAutoFit/>
+          </a:bodyPr>
+          <a:lstStyle/>
+          <a:p>
+            <a:pPr marL="457200" indent="-457200">
+              <a:lnSpc>
+                <a:spcPct val="150000"/>
+              </a:lnSpc>
+              <a:buFont typeface="Wingdings" panose="05000000000000000000" pitchFamily="2" charset="2"/>
+              <a:buChar char="Ø"/>
+            </a:pPr>
+            <a:r>
+              <a:rPr lang="en-US" sz="2800" b="1" dirty="0" smtClean="0">
+                <a:solidFill>
+                  <a:schemeClr val="tx2"/>
+                </a:solidFill>
+              </a:rPr>
+              <a:t>Usage of a PMSM motor to drive an electric gripper</a:t>
+            </a:r>
+          </a:p>
+          <a:p>
+            <a:pPr marL="457200" indent="-457200">
+              <a:lnSpc>
+                <a:spcPct val="150000"/>
+              </a:lnSpc>
+              <a:buFont typeface="Wingdings" panose="05000000000000000000" pitchFamily="2" charset="2"/>
+              <a:buChar char="Ø"/>
+            </a:pPr>
+            <a:r>
+              <a:rPr lang="en-US" sz="2800" b="1" dirty="0" smtClean="0">
+                <a:solidFill>
+                  <a:schemeClr val="tx2"/>
+                </a:solidFill>
+              </a:rPr>
+              <a:t>The motor will be controlled by the AMC_BLDC board</a:t>
+            </a:r>
+          </a:p>
+          <a:p>
+            <a:pPr marL="457200" indent="-457200">
+              <a:lnSpc>
+                <a:spcPct val="150000"/>
+              </a:lnSpc>
+              <a:buFont typeface="Wingdings" panose="05000000000000000000" pitchFamily="2" charset="2"/>
+              <a:buChar char="Ø"/>
+            </a:pPr>
+            <a:r>
+              <a:rPr lang="en-US" sz="2800" b="1" dirty="0" smtClean="0">
+                <a:solidFill>
+                  <a:schemeClr val="tx2"/>
+                </a:solidFill>
+              </a:rPr>
+              <a:t>Necessity to identify the motor parameters</a:t>
+            </a:r>
+          </a:p>
+          <a:p>
+            <a:pPr marL="914400" lvl="1" indent="-457200">
+              <a:lnSpc>
+                <a:spcPct val="150000"/>
+              </a:lnSpc>
+              <a:buFont typeface="Arial" panose="020B0604020202020204" pitchFamily="34" charset="0"/>
+              <a:buChar char="•"/>
+            </a:pPr>
+            <a:r>
+              <a:rPr lang="en-US" sz="2800" b="1" dirty="0" smtClean="0">
+                <a:solidFill>
+                  <a:schemeClr val="tx2"/>
+                </a:solidFill>
+              </a:rPr>
+              <a:t>Identification in static conditions</a:t>
+            </a:r>
+          </a:p>
+          <a:p>
+            <a:pPr marL="914400" lvl="1" indent="-457200">
+              <a:lnSpc>
+                <a:spcPct val="150000"/>
+              </a:lnSpc>
+              <a:buFont typeface="Arial" panose="020B0604020202020204" pitchFamily="34" charset="0"/>
+              <a:buChar char="•"/>
+            </a:pPr>
+            <a:r>
+              <a:rPr lang="en-US" sz="2800" b="1" dirty="0" smtClean="0">
+                <a:solidFill>
+                  <a:schemeClr val="tx2"/>
+                </a:solidFill>
+              </a:rPr>
+              <a:t>Identification in dynamic conditions</a:t>
+            </a:r>
+            <a:endParaRPr lang="en-US" sz="2800" b="1" dirty="0">
+              <a:solidFill>
+                <a:schemeClr val="tx2"/>
+              </a:solidFill>
+            </a:endParaRPr>
+          </a:p>
+        </p:txBody>
+      </p:sp>
     </p:spTree>
     <p:extLst>
       <p:ext uri="{BB962C8B-B14F-4D97-AF65-F5344CB8AC3E}">
@@ -1276,6 +1548,776 @@
       </p:par>
     </p:tnLst>
   </p:timing>
+</p:sld>
+</file>
+
+<file path=ppt/slides/slide3.xml><?xml version="1.0" encoding="utf-8"?>
+<p:sld xmlns:a="http://schemas.openxmlformats.org/drawingml/2006/main" xmlns:r="http://schemas.openxmlformats.org/officeDocument/2006/relationships" xmlns:p="http://schemas.openxmlformats.org/presentationml/2006/main">
+  <p:cSld>
+    <p:spTree>
+      <p:nvGrpSpPr>
+        <p:cNvPr id="1" name=""/>
+        <p:cNvGrpSpPr/>
+        <p:nvPr/>
+      </p:nvGrpSpPr>
+      <p:grpSpPr>
+        <a:xfrm>
+          <a:off x="0" y="0"/>
+          <a:ext cx="0" cy="0"/>
+          <a:chOff x="0" y="0"/>
+          <a:chExt cx="0" cy="0"/>
+        </a:xfrm>
+      </p:grpSpPr>
+      <p:sp>
+        <p:nvSpPr>
+          <p:cNvPr id="2" name="TextBox 1">
+            <a:extLst>
+              <a:ext uri="{FF2B5EF4-FFF2-40B4-BE49-F238E27FC236}">
+                <a16:creationId xmlns:a16="http://schemas.microsoft.com/office/drawing/2014/main" id="{E5263714-2E5E-4493-BEE6-6BC5D1695698}"/>
+              </a:ext>
+            </a:extLst>
+          </p:cNvPr>
+          <p:cNvSpPr txBox="1"/>
+          <p:nvPr/>
+        </p:nvSpPr>
+        <p:spPr>
+          <a:xfrm>
+            <a:off x="3516355" y="0"/>
+            <a:ext cx="5159297" cy="830997"/>
+          </a:xfrm>
+          <a:prstGeom prst="rect">
+            <a:avLst/>
+          </a:prstGeom>
+          <a:noFill/>
+        </p:spPr>
+        <p:txBody>
+          <a:bodyPr wrap="none" rtlCol="0">
+            <a:spAutoFit/>
+          </a:bodyPr>
+          <a:lstStyle/>
+          <a:p>
+            <a:pPr algn="ctr"/>
+            <a:r>
+              <a:rPr lang="en-US" sz="4800" b="1" dirty="0" smtClean="0">
+                <a:solidFill>
+                  <a:srgbClr val="0070C0"/>
+                </a:solidFill>
+              </a:rPr>
+              <a:t>Static Identification</a:t>
+            </a:r>
+            <a:endParaRPr lang="en-US" sz="4800" b="1" dirty="0">
+              <a:solidFill>
+                <a:srgbClr val="0070C0"/>
+              </a:solidFill>
+            </a:endParaRPr>
+          </a:p>
+        </p:txBody>
+      </p:sp>
+      <p:sp>
+        <p:nvSpPr>
+          <p:cNvPr id="6" name="Rectangle 5"/>
+          <p:cNvSpPr/>
+          <p:nvPr/>
+        </p:nvSpPr>
+        <p:spPr>
+          <a:xfrm>
+            <a:off x="1268455" y="2683042"/>
+            <a:ext cx="1376488" cy="745958"/>
+          </a:xfrm>
+          <a:prstGeom prst="rect">
+            <a:avLst/>
+          </a:prstGeom>
+          <a:ln w="38100"/>
+        </p:spPr>
+        <p:style>
+          <a:lnRef idx="2">
+            <a:schemeClr val="accent1"/>
+          </a:lnRef>
+          <a:fillRef idx="1">
+            <a:schemeClr val="lt1"/>
+          </a:fillRef>
+          <a:effectRef idx="0">
+            <a:schemeClr val="accent1"/>
+          </a:effectRef>
+          <a:fontRef idx="minor">
+            <a:schemeClr val="dk1"/>
+          </a:fontRef>
+        </p:style>
+        <p:txBody>
+          <a:bodyPr rtlCol="0" anchor="ctr"/>
+          <a:lstStyle/>
+          <a:p>
+            <a:pPr algn="ctr"/>
+            <a:r>
+              <a:rPr lang="en-US" dirty="0" smtClean="0"/>
+              <a:t>AMC_BLDC</a:t>
+            </a:r>
+            <a:endParaRPr lang="en-US" dirty="0"/>
+          </a:p>
+        </p:txBody>
+      </p:sp>
+      <p:sp>
+        <p:nvSpPr>
+          <p:cNvPr id="7" name="Rectangle 6"/>
+          <p:cNvSpPr/>
+          <p:nvPr/>
+        </p:nvSpPr>
+        <p:spPr>
+          <a:xfrm>
+            <a:off x="3725779" y="2683042"/>
+            <a:ext cx="1708484" cy="745958"/>
+          </a:xfrm>
+          <a:prstGeom prst="rect">
+            <a:avLst/>
+          </a:prstGeom>
+          <a:ln w="38100"/>
+        </p:spPr>
+        <p:style>
+          <a:lnRef idx="2">
+            <a:schemeClr val="accent1"/>
+          </a:lnRef>
+          <a:fillRef idx="1">
+            <a:schemeClr val="lt1"/>
+          </a:fillRef>
+          <a:effectRef idx="0">
+            <a:schemeClr val="accent1"/>
+          </a:effectRef>
+          <a:fontRef idx="minor">
+            <a:schemeClr val="dk1"/>
+          </a:fontRef>
+        </p:style>
+        <p:txBody>
+          <a:bodyPr rtlCol="0" anchor="ctr"/>
+          <a:lstStyle/>
+          <a:p>
+            <a:pPr algn="ctr"/>
+            <a:r>
+              <a:rPr lang="en-US" dirty="0" smtClean="0"/>
+              <a:t>PMSM</a:t>
+            </a:r>
+          </a:p>
+          <a:p>
+            <a:pPr algn="ctr"/>
+            <a:r>
+              <a:rPr lang="en-US" dirty="0" smtClean="0"/>
+              <a:t>Motor</a:t>
+            </a:r>
+            <a:endParaRPr lang="en-US" dirty="0"/>
+          </a:p>
+        </p:txBody>
+      </p:sp>
+      <p:sp>
+        <p:nvSpPr>
+          <p:cNvPr id="8" name="Rectangle 7"/>
+          <p:cNvSpPr/>
+          <p:nvPr/>
+        </p:nvSpPr>
+        <p:spPr>
+          <a:xfrm>
+            <a:off x="6515099" y="2683042"/>
+            <a:ext cx="1708484" cy="745958"/>
+          </a:xfrm>
+          <a:prstGeom prst="rect">
+            <a:avLst/>
+          </a:prstGeom>
+          <a:ln w="38100"/>
+        </p:spPr>
+        <p:style>
+          <a:lnRef idx="2">
+            <a:schemeClr val="accent1"/>
+          </a:lnRef>
+          <a:fillRef idx="1">
+            <a:schemeClr val="lt1"/>
+          </a:fillRef>
+          <a:effectRef idx="0">
+            <a:schemeClr val="accent1"/>
+          </a:effectRef>
+          <a:fontRef idx="minor">
+            <a:schemeClr val="dk1"/>
+          </a:fontRef>
+        </p:style>
+        <p:txBody>
+          <a:bodyPr rtlCol="0" anchor="ctr"/>
+          <a:lstStyle/>
+          <a:p>
+            <a:pPr algn="ctr"/>
+            <a:r>
+              <a:rPr lang="en-US" dirty="0" smtClean="0"/>
+              <a:t>Torque Sensor</a:t>
+            </a:r>
+            <a:endParaRPr lang="en-US" dirty="0"/>
+          </a:p>
+        </p:txBody>
+      </p:sp>
+      <p:cxnSp>
+        <p:nvCxnSpPr>
+          <p:cNvPr id="11" name="Straight Arrow Connector 10"/>
+          <p:cNvCxnSpPr>
+            <a:stCxn id="6" idx="3"/>
+            <a:endCxn id="7" idx="1"/>
+          </p:cNvCxnSpPr>
+          <p:nvPr/>
+        </p:nvCxnSpPr>
+        <p:spPr>
+          <a:xfrm>
+            <a:off x="2644943" y="3056021"/>
+            <a:ext cx="1080836" cy="0"/>
+          </a:xfrm>
+          <a:prstGeom prst="straightConnector1">
+            <a:avLst/>
+          </a:prstGeom>
+          <a:ln w="38100">
+            <a:tailEnd type="triangle"/>
+          </a:ln>
+        </p:spPr>
+        <p:style>
+          <a:lnRef idx="1">
+            <a:schemeClr val="accent1"/>
+          </a:lnRef>
+          <a:fillRef idx="0">
+            <a:schemeClr val="accent1"/>
+          </a:fillRef>
+          <a:effectRef idx="0">
+            <a:schemeClr val="accent1"/>
+          </a:effectRef>
+          <a:fontRef idx="minor">
+            <a:schemeClr val="tx1"/>
+          </a:fontRef>
+        </p:style>
+      </p:cxnSp>
+      <p:cxnSp>
+        <p:nvCxnSpPr>
+          <p:cNvPr id="12" name="Straight Arrow Connector 11"/>
+          <p:cNvCxnSpPr>
+            <a:stCxn id="7" idx="3"/>
+            <a:endCxn id="8" idx="1"/>
+          </p:cNvCxnSpPr>
+          <p:nvPr/>
+        </p:nvCxnSpPr>
+        <p:spPr>
+          <a:xfrm>
+            <a:off x="5434263" y="3056021"/>
+            <a:ext cx="1080836" cy="0"/>
+          </a:xfrm>
+          <a:prstGeom prst="straightConnector1">
+            <a:avLst/>
+          </a:prstGeom>
+          <a:ln w="38100">
+            <a:tailEnd type="triangle"/>
+          </a:ln>
+        </p:spPr>
+        <p:style>
+          <a:lnRef idx="1">
+            <a:schemeClr val="accent1"/>
+          </a:lnRef>
+          <a:fillRef idx="0">
+            <a:schemeClr val="accent1"/>
+          </a:fillRef>
+          <a:effectRef idx="0">
+            <a:schemeClr val="accent1"/>
+          </a:effectRef>
+          <a:fontRef idx="minor">
+            <a:schemeClr val="tx1"/>
+          </a:fontRef>
+        </p:style>
+      </p:cxnSp>
+      <p:sp>
+        <p:nvSpPr>
+          <p:cNvPr id="16" name="Rectangle 15"/>
+          <p:cNvSpPr/>
+          <p:nvPr/>
+        </p:nvSpPr>
+        <p:spPr>
+          <a:xfrm>
+            <a:off x="9304419" y="2683042"/>
+            <a:ext cx="1708484" cy="745958"/>
+          </a:xfrm>
+          <a:prstGeom prst="rect">
+            <a:avLst/>
+          </a:prstGeom>
+          <a:ln w="38100"/>
+        </p:spPr>
+        <p:style>
+          <a:lnRef idx="2">
+            <a:schemeClr val="accent1"/>
+          </a:lnRef>
+          <a:fillRef idx="1">
+            <a:schemeClr val="lt1"/>
+          </a:fillRef>
+          <a:effectRef idx="0">
+            <a:schemeClr val="accent1"/>
+          </a:effectRef>
+          <a:fontRef idx="minor">
+            <a:schemeClr val="dk1"/>
+          </a:fontRef>
+        </p:style>
+        <p:txBody>
+          <a:bodyPr rtlCol="0" anchor="ctr"/>
+          <a:lstStyle/>
+          <a:p>
+            <a:pPr algn="ctr"/>
+            <a:r>
+              <a:rPr lang="en-US" dirty="0" smtClean="0"/>
+              <a:t>CAN </a:t>
+            </a:r>
+            <a:r>
+              <a:rPr lang="en-US" dirty="0" err="1" smtClean="0"/>
+              <a:t>Msg</a:t>
+            </a:r>
+            <a:endParaRPr lang="en-US" dirty="0"/>
+          </a:p>
+          <a:p>
+            <a:pPr algn="ctr"/>
+            <a:r>
+              <a:rPr lang="en-US" dirty="0" smtClean="0"/>
+              <a:t>Reader</a:t>
+            </a:r>
+            <a:endParaRPr lang="en-US" dirty="0"/>
+          </a:p>
+        </p:txBody>
+      </p:sp>
+      <p:cxnSp>
+        <p:nvCxnSpPr>
+          <p:cNvPr id="17" name="Straight Arrow Connector 16"/>
+          <p:cNvCxnSpPr>
+            <a:stCxn id="8" idx="3"/>
+            <a:endCxn id="16" idx="1"/>
+          </p:cNvCxnSpPr>
+          <p:nvPr/>
+        </p:nvCxnSpPr>
+        <p:spPr>
+          <a:xfrm>
+            <a:off x="8223583" y="3056021"/>
+            <a:ext cx="1080836" cy="0"/>
+          </a:xfrm>
+          <a:prstGeom prst="straightConnector1">
+            <a:avLst/>
+          </a:prstGeom>
+          <a:ln w="38100">
+            <a:tailEnd type="triangle"/>
+          </a:ln>
+        </p:spPr>
+        <p:style>
+          <a:lnRef idx="1">
+            <a:schemeClr val="accent1"/>
+          </a:lnRef>
+          <a:fillRef idx="0">
+            <a:schemeClr val="accent1"/>
+          </a:fillRef>
+          <a:effectRef idx="0">
+            <a:schemeClr val="accent1"/>
+          </a:effectRef>
+          <a:fontRef idx="minor">
+            <a:schemeClr val="tx1"/>
+          </a:fontRef>
+        </p:style>
+      </p:cxnSp>
+    </p:spTree>
+    <p:extLst>
+      <p:ext uri="{BB962C8B-B14F-4D97-AF65-F5344CB8AC3E}">
+        <p14:creationId xmlns:p14="http://schemas.microsoft.com/office/powerpoint/2010/main" val="2113801628"/>
+      </p:ext>
+    </p:extLst>
+  </p:cSld>
+  <p:clrMapOvr>
+    <a:masterClrMapping/>
+  </p:clrMapOvr>
+</p:sld>
+</file>
+
+<file path=ppt/slides/slide4.xml><?xml version="1.0" encoding="utf-8"?>
+<p:sld xmlns:a="http://schemas.openxmlformats.org/drawingml/2006/main" xmlns:r="http://schemas.openxmlformats.org/officeDocument/2006/relationships" xmlns:p="http://schemas.openxmlformats.org/presentationml/2006/main">
+  <p:cSld>
+    <p:spTree>
+      <p:nvGrpSpPr>
+        <p:cNvPr id="1" name=""/>
+        <p:cNvGrpSpPr/>
+        <p:nvPr/>
+      </p:nvGrpSpPr>
+      <p:grpSpPr>
+        <a:xfrm>
+          <a:off x="0" y="0"/>
+          <a:ext cx="0" cy="0"/>
+          <a:chOff x="0" y="0"/>
+          <a:chExt cx="0" cy="0"/>
+        </a:xfrm>
+      </p:grpSpPr>
+      <p:sp>
+        <p:nvSpPr>
+          <p:cNvPr id="2" name="TextBox 1">
+            <a:extLst>
+              <a:ext uri="{FF2B5EF4-FFF2-40B4-BE49-F238E27FC236}">
+                <a16:creationId xmlns:a16="http://schemas.microsoft.com/office/drawing/2014/main" id="{E5263714-2E5E-4493-BEE6-6BC5D1695698}"/>
+              </a:ext>
+            </a:extLst>
+          </p:cNvPr>
+          <p:cNvSpPr txBox="1"/>
+          <p:nvPr/>
+        </p:nvSpPr>
+        <p:spPr>
+          <a:xfrm>
+            <a:off x="4464789" y="0"/>
+            <a:ext cx="3262433" cy="830997"/>
+          </a:xfrm>
+          <a:prstGeom prst="rect">
+            <a:avLst/>
+          </a:prstGeom>
+          <a:noFill/>
+        </p:spPr>
+        <p:txBody>
+          <a:bodyPr wrap="none" rtlCol="0">
+            <a:spAutoFit/>
+          </a:bodyPr>
+          <a:lstStyle/>
+          <a:p>
+            <a:pPr algn="ctr"/>
+            <a:r>
+              <a:rPr lang="en-US" sz="4800" b="1" dirty="0" smtClean="0">
+                <a:solidFill>
+                  <a:srgbClr val="0070C0"/>
+                </a:solidFill>
+              </a:rPr>
+              <a:t>FT45 Sensor</a:t>
+            </a:r>
+            <a:endParaRPr lang="en-US" sz="4800" b="1" dirty="0">
+              <a:solidFill>
+                <a:srgbClr val="0070C0"/>
+              </a:solidFill>
+            </a:endParaRPr>
+          </a:p>
+        </p:txBody>
+      </p:sp>
+      <p:pic>
+        <p:nvPicPr>
+          <p:cNvPr id="3" name="Picture 2"/>
+          <p:cNvPicPr>
+            <a:picLocks noChangeAspect="1"/>
+          </p:cNvPicPr>
+          <p:nvPr/>
+        </p:nvPicPr>
+        <p:blipFill>
+          <a:blip r:embed="rId2">
+            <a:extLst>
+              <a:ext uri="{28A0092B-C50C-407E-A947-70E740481C1C}">
+                <a14:useLocalDpi xmlns:a14="http://schemas.microsoft.com/office/drawing/2010/main" val="0"/>
+              </a:ext>
+            </a:extLst>
+          </a:blip>
+          <a:stretch>
+            <a:fillRect/>
+          </a:stretch>
+        </p:blipFill>
+        <p:spPr>
+          <a:xfrm>
+            <a:off x="459206" y="3067035"/>
+            <a:ext cx="4842711" cy="3360841"/>
+          </a:xfrm>
+          <a:prstGeom prst="rect">
+            <a:avLst/>
+          </a:prstGeom>
+        </p:spPr>
+      </p:pic>
+      <p:pic>
+        <p:nvPicPr>
+          <p:cNvPr id="4" name="Picture 3"/>
+          <p:cNvPicPr>
+            <a:picLocks noChangeAspect="1"/>
+          </p:cNvPicPr>
+          <p:nvPr/>
+        </p:nvPicPr>
+        <p:blipFill>
+          <a:blip r:embed="rId3">
+            <a:extLst>
+              <a:ext uri="{28A0092B-C50C-407E-A947-70E740481C1C}">
+                <a14:useLocalDpi xmlns:a14="http://schemas.microsoft.com/office/drawing/2010/main" val="0"/>
+              </a:ext>
+            </a:extLst>
+          </a:blip>
+          <a:stretch>
+            <a:fillRect/>
+          </a:stretch>
+        </p:blipFill>
+        <p:spPr>
+          <a:xfrm>
+            <a:off x="6819194" y="3134688"/>
+            <a:ext cx="3568069" cy="3225534"/>
+          </a:xfrm>
+          <a:prstGeom prst="rect">
+            <a:avLst/>
+          </a:prstGeom>
+        </p:spPr>
+      </p:pic>
+      <p:sp>
+        <p:nvSpPr>
+          <p:cNvPr id="5" name="TextBox 4"/>
+          <p:cNvSpPr txBox="1"/>
+          <p:nvPr/>
+        </p:nvSpPr>
+        <p:spPr>
+          <a:xfrm>
+            <a:off x="256674" y="1355558"/>
+            <a:ext cx="5967663" cy="1477328"/>
+          </a:xfrm>
+          <a:prstGeom prst="rect">
+            <a:avLst/>
+          </a:prstGeom>
+          <a:noFill/>
+        </p:spPr>
+        <p:txBody>
+          <a:bodyPr wrap="square" rtlCol="0">
+            <a:spAutoFit/>
+          </a:bodyPr>
+          <a:lstStyle/>
+          <a:p>
+            <a:pPr marL="457200" indent="-457200">
+              <a:spcAft>
+                <a:spcPts val="600"/>
+              </a:spcAft>
+              <a:buFont typeface="Wingdings" panose="05000000000000000000" pitchFamily="2" charset="2"/>
+              <a:buChar char="Ø"/>
+            </a:pPr>
+            <a:r>
+              <a:rPr lang="en-US" sz="2000" b="1" dirty="0" smtClean="0">
+                <a:solidFill>
+                  <a:schemeClr val="tx2"/>
+                </a:solidFill>
+              </a:rPr>
+              <a:t>6 Degrees of Freedom Sensor</a:t>
+            </a:r>
+          </a:p>
+          <a:p>
+            <a:pPr marL="457200" indent="-457200">
+              <a:spcAft>
+                <a:spcPts val="600"/>
+              </a:spcAft>
+              <a:buFont typeface="Wingdings" panose="05000000000000000000" pitchFamily="2" charset="2"/>
+              <a:buChar char="Ø"/>
+            </a:pPr>
+            <a:r>
+              <a:rPr lang="en-US" sz="2000" b="1" dirty="0" smtClean="0">
+                <a:solidFill>
+                  <a:schemeClr val="tx2"/>
+                </a:solidFill>
+              </a:rPr>
+              <a:t>Based </a:t>
+            </a:r>
+            <a:r>
+              <a:rPr lang="en-US" sz="2000" b="1" dirty="0">
+                <a:solidFill>
+                  <a:schemeClr val="tx2"/>
+                </a:solidFill>
+              </a:rPr>
+              <a:t>on a </a:t>
+            </a:r>
+            <a:r>
+              <a:rPr lang="en-US" sz="2000" b="1" dirty="0" smtClean="0">
+                <a:solidFill>
+                  <a:schemeClr val="tx2"/>
+                </a:solidFill>
+              </a:rPr>
+              <a:t>Wheatstone bridge</a:t>
+            </a:r>
+          </a:p>
+          <a:p>
+            <a:pPr marL="457200" indent="-457200">
+              <a:spcAft>
+                <a:spcPts val="600"/>
+              </a:spcAft>
+              <a:buFont typeface="Wingdings" panose="05000000000000000000" pitchFamily="2" charset="2"/>
+              <a:buChar char="Ø"/>
+            </a:pPr>
+            <a:r>
+              <a:rPr lang="en-US" sz="2000" b="1" dirty="0" smtClean="0">
+                <a:solidFill>
+                  <a:schemeClr val="tx2"/>
+                </a:solidFill>
+              </a:rPr>
+              <a:t>12 </a:t>
+            </a:r>
+            <a:r>
+              <a:rPr lang="en-US" sz="2000" b="1" dirty="0">
+                <a:solidFill>
+                  <a:schemeClr val="tx2"/>
+                </a:solidFill>
+              </a:rPr>
+              <a:t>semiconductor strain gauges arranged in a 6 </a:t>
+            </a:r>
+            <a:r>
+              <a:rPr lang="en-US" sz="2000" b="1" dirty="0" smtClean="0">
+                <a:solidFill>
+                  <a:schemeClr val="tx2"/>
+                </a:solidFill>
+              </a:rPr>
+              <a:t>half-bridges configuration  </a:t>
+            </a:r>
+            <a:endParaRPr lang="en-US" sz="2000" b="1" dirty="0">
+              <a:solidFill>
+                <a:schemeClr val="tx2"/>
+              </a:solidFill>
+            </a:endParaRPr>
+          </a:p>
+        </p:txBody>
+      </p:sp>
+    </p:spTree>
+    <p:extLst>
+      <p:ext uri="{BB962C8B-B14F-4D97-AF65-F5344CB8AC3E}">
+        <p14:creationId xmlns:p14="http://schemas.microsoft.com/office/powerpoint/2010/main" val="1605911083"/>
+      </p:ext>
+    </p:extLst>
+  </p:cSld>
+  <p:clrMapOvr>
+    <a:masterClrMapping/>
+  </p:clrMapOvr>
+</p:sld>
+</file>
+
+<file path=ppt/slides/slide5.xml><?xml version="1.0" encoding="utf-8"?>
+<p:sld xmlns:a="http://schemas.openxmlformats.org/drawingml/2006/main" xmlns:r="http://schemas.openxmlformats.org/officeDocument/2006/relationships" xmlns:p="http://schemas.openxmlformats.org/presentationml/2006/main">
+  <p:cSld>
+    <p:spTree>
+      <p:nvGrpSpPr>
+        <p:cNvPr id="1" name=""/>
+        <p:cNvGrpSpPr/>
+        <p:nvPr/>
+      </p:nvGrpSpPr>
+      <p:grpSpPr>
+        <a:xfrm>
+          <a:off x="0" y="0"/>
+          <a:ext cx="0" cy="0"/>
+          <a:chOff x="0" y="0"/>
+          <a:chExt cx="0" cy="0"/>
+        </a:xfrm>
+      </p:grpSpPr>
+      <p:sp>
+        <p:nvSpPr>
+          <p:cNvPr id="2" name="TextBox 1">
+            <a:extLst>
+              <a:ext uri="{FF2B5EF4-FFF2-40B4-BE49-F238E27FC236}">
+                <a16:creationId xmlns:a16="http://schemas.microsoft.com/office/drawing/2014/main" id="{E5263714-2E5E-4493-BEE6-6BC5D1695698}"/>
+              </a:ext>
+            </a:extLst>
+          </p:cNvPr>
+          <p:cNvSpPr txBox="1"/>
+          <p:nvPr/>
+        </p:nvSpPr>
+        <p:spPr>
+          <a:xfrm>
+            <a:off x="1935662" y="120315"/>
+            <a:ext cx="8320676" cy="830997"/>
+          </a:xfrm>
+          <a:prstGeom prst="rect">
+            <a:avLst/>
+          </a:prstGeom>
+          <a:noFill/>
+        </p:spPr>
+        <p:txBody>
+          <a:bodyPr wrap="none" rtlCol="0">
+            <a:spAutoFit/>
+          </a:bodyPr>
+          <a:lstStyle/>
+          <a:p>
+            <a:pPr algn="ctr"/>
+            <a:r>
+              <a:rPr lang="en-US" sz="4800" b="1" dirty="0" smtClean="0">
+                <a:solidFill>
+                  <a:srgbClr val="0070C0"/>
+                </a:solidFill>
+              </a:rPr>
+              <a:t>Current CAN messaging method</a:t>
+            </a:r>
+            <a:endParaRPr lang="en-US" sz="4800" b="1" dirty="0">
+              <a:solidFill>
+                <a:srgbClr val="0070C0"/>
+              </a:solidFill>
+            </a:endParaRPr>
+          </a:p>
+        </p:txBody>
+      </p:sp>
+    </p:spTree>
+    <p:extLst>
+      <p:ext uri="{BB962C8B-B14F-4D97-AF65-F5344CB8AC3E}">
+        <p14:creationId xmlns:p14="http://schemas.microsoft.com/office/powerpoint/2010/main" val="116346007"/>
+      </p:ext>
+    </p:extLst>
+  </p:cSld>
+  <p:clrMapOvr>
+    <a:masterClrMapping/>
+  </p:clrMapOvr>
+</p:sld>
+</file>
+
+<file path=ppt/slides/slide6.xml><?xml version="1.0" encoding="utf-8"?>
+<p:sld xmlns:a="http://schemas.openxmlformats.org/drawingml/2006/main" xmlns:r="http://schemas.openxmlformats.org/officeDocument/2006/relationships" xmlns:p="http://schemas.openxmlformats.org/presentationml/2006/main">
+  <p:cSld>
+    <p:spTree>
+      <p:nvGrpSpPr>
+        <p:cNvPr id="1" name=""/>
+        <p:cNvGrpSpPr/>
+        <p:nvPr/>
+      </p:nvGrpSpPr>
+      <p:grpSpPr>
+        <a:xfrm>
+          <a:off x="0" y="0"/>
+          <a:ext cx="0" cy="0"/>
+          <a:chOff x="0" y="0"/>
+          <a:chExt cx="0" cy="0"/>
+        </a:xfrm>
+      </p:grpSpPr>
+      <p:sp>
+        <p:nvSpPr>
+          <p:cNvPr id="2" name="TextBox 1">
+            <a:extLst>
+              <a:ext uri="{FF2B5EF4-FFF2-40B4-BE49-F238E27FC236}">
+                <a16:creationId xmlns:a16="http://schemas.microsoft.com/office/drawing/2014/main" id="{E5263714-2E5E-4493-BEE6-6BC5D1695698}"/>
+              </a:ext>
+            </a:extLst>
+          </p:cNvPr>
+          <p:cNvSpPr txBox="1"/>
+          <p:nvPr/>
+        </p:nvSpPr>
+        <p:spPr>
+          <a:xfrm>
+            <a:off x="1354054" y="243883"/>
+            <a:ext cx="9945222" cy="646331"/>
+          </a:xfrm>
+          <a:prstGeom prst="rect">
+            <a:avLst/>
+          </a:prstGeom>
+          <a:noFill/>
+        </p:spPr>
+        <p:txBody>
+          <a:bodyPr wrap="none" rtlCol="0">
+            <a:spAutoFit/>
+          </a:bodyPr>
+          <a:lstStyle/>
+          <a:p>
+            <a:pPr algn="ctr"/>
+            <a:r>
+              <a:rPr lang="en-US" sz="3600" b="1" dirty="0" smtClean="0">
+                <a:solidFill>
+                  <a:srgbClr val="0070C0"/>
+                </a:solidFill>
+              </a:rPr>
+              <a:t>Proposed CAN messaging with Vector and Simulink</a:t>
+            </a:r>
+            <a:endParaRPr lang="en-US" sz="3600" b="1" dirty="0">
+              <a:solidFill>
+                <a:srgbClr val="0070C0"/>
+              </a:solidFill>
+            </a:endParaRPr>
+          </a:p>
+        </p:txBody>
+      </p:sp>
+    </p:spTree>
+    <p:extLst>
+      <p:ext uri="{BB962C8B-B14F-4D97-AF65-F5344CB8AC3E}">
+        <p14:creationId xmlns:p14="http://schemas.microsoft.com/office/powerpoint/2010/main" val="139317225"/>
+      </p:ext>
+    </p:extLst>
+  </p:cSld>
+  <p:clrMapOvr>
+    <a:masterClrMapping/>
+  </p:clrMapOvr>
 </p:sld>
 </file>
 
@@ -2165,18 +3207,18 @@
 </file>
 
 <file path=customXml/item1.xml><?xml version="1.0" encoding="utf-8"?>
+<p:properties xmlns:p="http://schemas.microsoft.com/office/2006/metadata/properties" xmlns:xsi="http://www.w3.org/2001/XMLSchema-instance" xmlns:pc="http://schemas.microsoft.com/office/infopath/2007/PartnerControls">
+  <documentManagement/>
+</p:properties>
+</file>
+
+<file path=customXml/item2.xml><?xml version="1.0" encoding="utf-8"?>
 <?mso-contentType ?>
 <FormTemplates xmlns="http://schemas.microsoft.com/sharepoint/v3/contenttype/forms">
   <Display>DocumentLibraryForm</Display>
   <Edit>DocumentLibraryForm</Edit>
   <New>DocumentLibraryForm</New>
 </FormTemplates>
-</file>
-
-<file path=customXml/item2.xml><?xml version="1.0" encoding="utf-8"?>
-<p:properties xmlns:p="http://schemas.microsoft.com/office/2006/metadata/properties" xmlns:xsi="http://www.w3.org/2001/XMLSchema-instance" xmlns:pc="http://schemas.microsoft.com/office/infopath/2007/PartnerControls">
-  <documentManagement/>
-</p:properties>
 </file>
 
 <file path=customXml/item3.xml><?xml version="1.0" encoding="utf-8"?>
@@ -2403,16 +3445,10 @@
 </file>
 
 <file path=customXml/itemProps1.xml><?xml version="1.0" encoding="utf-8"?>
-<ds:datastoreItem xmlns:ds="http://schemas.openxmlformats.org/officeDocument/2006/customXml" ds:itemID="{B04070C4-139B-4E40-A792-B668524D057A}">
-  <ds:schemaRefs>
-    <ds:schemaRef ds:uri="http://schemas.microsoft.com/sharepoint/v3/contenttype/forms"/>
-  </ds:schemaRefs>
-</ds:datastoreItem>
-</file>
-
-<file path=customXml/itemProps2.xml><?xml version="1.0" encoding="utf-8"?>
 <ds:datastoreItem xmlns:ds="http://schemas.openxmlformats.org/officeDocument/2006/customXml" ds:itemID="{9ACC3CE8-C567-4D72-804F-FFEC711F513E}">
   <ds:schemaRefs>
+    <ds:schemaRef ds:uri="http://schemas.microsoft.com/office/2006/documentManagement/types"/>
+    <ds:schemaRef ds:uri="http://purl.org/dc/elements/1.1/"/>
     <ds:schemaRef ds:uri="http://schemas.microsoft.com/office/2006/metadata/properties"/>
     <ds:schemaRef ds:uri="a9d2133a-30b9-46e4-a20a-9e90a26e7d6b"/>
     <ds:schemaRef ds:uri="83c88cb7-92ec-4738-b55f-19dddbc2678d"/>
@@ -2420,9 +3456,15 @@
     <ds:schemaRef ds:uri="http://schemas.openxmlformats.org/package/2006/metadata/core-properties"/>
     <ds:schemaRef ds:uri="http://purl.org/dc/dcmitype/"/>
     <ds:schemaRef ds:uri="http://schemas.microsoft.com/office/infopath/2007/PartnerControls"/>
-    <ds:schemaRef ds:uri="http://schemas.microsoft.com/office/2006/documentManagement/types"/>
-    <ds:schemaRef ds:uri="http://purl.org/dc/elements/1.1/"/>
     <ds:schemaRef ds:uri="http://www.w3.org/XML/1998/namespace"/>
+  </ds:schemaRefs>
+</ds:datastoreItem>
+</file>
+
+<file path=customXml/itemProps2.xml><?xml version="1.0" encoding="utf-8"?>
+<ds:datastoreItem xmlns:ds="http://schemas.openxmlformats.org/officeDocument/2006/customXml" ds:itemID="{B04070C4-139B-4E40-A792-B668524D057A}">
+  <ds:schemaRefs>
+    <ds:schemaRef ds:uri="http://schemas.microsoft.com/sharepoint/v3/contenttype/forms"/>
   </ds:schemaRefs>
 </ds:datastoreItem>
 </file>

</xml_diff>

<commit_message>
switch endianness of retrieved full scale
</commit_message>
<xml_diff>
--- a/assets/camozzi_presentation_20220111.pptx
+++ b/assets/camozzi_presentation_20220111.pptx
@@ -5,10 +5,10 @@
     <p:sldMasterId id="2147483648" r:id="rId4"/>
   </p:sldMasterIdLst>
   <p:notesMasterIdLst>
-    <p:notesMasterId r:id="rId11"/>
+    <p:notesMasterId r:id="rId12"/>
   </p:notesMasterIdLst>
   <p:handoutMasterIdLst>
-    <p:handoutMasterId r:id="rId12"/>
+    <p:handoutMasterId r:id="rId13"/>
   </p:handoutMasterIdLst>
   <p:sldIdLst>
     <p:sldId id="256" r:id="rId5"/>
@@ -17,6 +17,7 @@
     <p:sldId id="330" r:id="rId8"/>
     <p:sldId id="331" r:id="rId9"/>
     <p:sldId id="332" r:id="rId10"/>
+    <p:sldId id="333" r:id="rId11"/>
   </p:sldIdLst>
   <p:sldSz cx="12192000" cy="6858000"/>
   <p:notesSz cx="6858000" cy="9144000"/>
@@ -130,6 +131,7 @@
             <p14:sldId id="330"/>
             <p14:sldId id="331"/>
             <p14:sldId id="332"/>
+            <p14:sldId id="333"/>
           </p14:sldIdLst>
         </p14:section>
       </p14:sectionLst>
@@ -278,7 +280,7 @@
           <a:p>
             <a:fld id="{E91B208A-7CDB-4552-AD91-0C1C9B295544}" type="datetimeFigureOut">
               <a:rPr lang="en-US" smtClean="0"/>
-              <a:t>05-Jan-22</a:t>
+              <a:t>07-Jan-22</a:t>
             </a:fld>
             <a:endParaRPr lang="en-US"/>
           </a:p>
@@ -455,7 +457,7 @@
           <a:p>
             <a:fld id="{84587D73-95CE-4367-99D7-B70AFB15B40E}" type="datetimeFigureOut">
               <a:rPr lang="en-US" smtClean="0"/>
-              <a:t>05-Jan-22</a:t>
+              <a:t>07-Jan-22</a:t>
             </a:fld>
             <a:endParaRPr lang="en-US"/>
           </a:p>
@@ -766,6 +768,10 @@
           <a:bodyPr/>
           <a:lstStyle/>
           <a:p>
+            <a:r>
+              <a:rPr lang="en-US" dirty="0" smtClean="0"/>
+              <a:t>To merge with 3</a:t>
+            </a:r>
             <a:endParaRPr lang="en-US" dirty="0"/>
           </a:p>
         </p:txBody>
@@ -1317,15 +1323,7 @@
                   <a:srgbClr val="0070C0"/>
                 </a:solidFill>
               </a:rPr>
-              <a:t>FT sensors: </a:t>
-            </a:r>
-            <a:r>
-              <a:rPr lang="en-US" sz="4800" b="1" dirty="0" smtClean="0">
-                <a:solidFill>
-                  <a:srgbClr val="0070C0"/>
-                </a:solidFill>
-              </a:rPr>
-              <a:t>an application for </a:t>
+              <a:t>FT sensors: an application for </a:t>
             </a:r>
             <a:r>
               <a:rPr lang="en-US" sz="4800" b="1" dirty="0" err="1" smtClean="0">
@@ -2233,6 +2231,66 @@
           </a:p>
         </p:txBody>
       </p:sp>
+      <p:sp>
+        <p:nvSpPr>
+          <p:cNvPr id="3" name="TextBox 2"/>
+          <p:cNvSpPr txBox="1"/>
+          <p:nvPr/>
+        </p:nvSpPr>
+        <p:spPr>
+          <a:xfrm>
+            <a:off x="818484" y="1553840"/>
+            <a:ext cx="3075709" cy="369332"/>
+          </a:xfrm>
+          <a:prstGeom prst="rect">
+            <a:avLst/>
+          </a:prstGeom>
+          <a:noFill/>
+        </p:spPr>
+        <p:txBody>
+          <a:bodyPr wrap="square" rtlCol="0">
+            <a:spAutoFit/>
+          </a:bodyPr>
+          <a:lstStyle/>
+          <a:p>
+            <a:r>
+              <a:rPr lang="en-US" dirty="0" smtClean="0"/>
+              <a:t>ESD CAN PICTURE</a:t>
+            </a:r>
+            <a:endParaRPr lang="en-US" dirty="0"/>
+          </a:p>
+        </p:txBody>
+      </p:sp>
+      <p:sp>
+        <p:nvSpPr>
+          <p:cNvPr id="4" name="TextBox 3"/>
+          <p:cNvSpPr txBox="1"/>
+          <p:nvPr/>
+        </p:nvSpPr>
+        <p:spPr>
+          <a:xfrm>
+            <a:off x="874967" y="2901994"/>
+            <a:ext cx="3075709" cy="646331"/>
+          </a:xfrm>
+          <a:prstGeom prst="rect">
+            <a:avLst/>
+          </a:prstGeom>
+          <a:noFill/>
+        </p:spPr>
+        <p:txBody>
+          <a:bodyPr wrap="square" rtlCol="0">
+            <a:spAutoFit/>
+          </a:bodyPr>
+          <a:lstStyle/>
+          <a:p>
+            <a:r>
+              <a:rPr lang="en-US" dirty="0" smtClean="0"/>
+              <a:t>SIMULINK MODEL WITH CUSTOM BLOCKS</a:t>
+            </a:r>
+            <a:endParaRPr lang="en-US" dirty="0"/>
+          </a:p>
+        </p:txBody>
+      </p:sp>
     </p:spTree>
     <p:extLst>
       <p:ext uri="{BB962C8B-B14F-4D97-AF65-F5344CB8AC3E}">
@@ -2308,10 +2366,115 @@
           </a:p>
         </p:txBody>
       </p:sp>
+      <p:sp>
+        <p:nvSpPr>
+          <p:cNvPr id="3" name="TextBox 2"/>
+          <p:cNvSpPr txBox="1"/>
+          <p:nvPr/>
+        </p:nvSpPr>
+        <p:spPr>
+          <a:xfrm>
+            <a:off x="818484" y="1553840"/>
+            <a:ext cx="3075709" cy="369332"/>
+          </a:xfrm>
+          <a:prstGeom prst="rect">
+            <a:avLst/>
+          </a:prstGeom>
+          <a:noFill/>
+        </p:spPr>
+        <p:txBody>
+          <a:bodyPr wrap="square" rtlCol="0">
+            <a:spAutoFit/>
+          </a:bodyPr>
+          <a:lstStyle/>
+          <a:p>
+            <a:r>
+              <a:rPr lang="en-US" dirty="0" smtClean="0"/>
+              <a:t>DIAGRAM WITH VECTOR</a:t>
+            </a:r>
+            <a:endParaRPr lang="en-US" dirty="0"/>
+          </a:p>
+        </p:txBody>
+      </p:sp>
     </p:spTree>
     <p:extLst>
       <p:ext uri="{BB962C8B-B14F-4D97-AF65-F5344CB8AC3E}">
         <p14:creationId xmlns:p14="http://schemas.microsoft.com/office/powerpoint/2010/main" val="139317225"/>
+      </p:ext>
+    </p:extLst>
+  </p:cSld>
+  <p:clrMapOvr>
+    <a:masterClrMapping/>
+  </p:clrMapOvr>
+</p:sld>
+</file>
+
+<file path=ppt/slides/slide7.xml><?xml version="1.0" encoding="utf-8"?>
+<p:sld xmlns:a="http://schemas.openxmlformats.org/drawingml/2006/main" xmlns:r="http://schemas.openxmlformats.org/officeDocument/2006/relationships" xmlns:p="http://schemas.openxmlformats.org/presentationml/2006/main">
+  <p:cSld>
+    <p:spTree>
+      <p:nvGrpSpPr>
+        <p:cNvPr id="1" name=""/>
+        <p:cNvGrpSpPr/>
+        <p:nvPr/>
+      </p:nvGrpSpPr>
+      <p:grpSpPr>
+        <a:xfrm>
+          <a:off x="0" y="0"/>
+          <a:ext cx="0" cy="0"/>
+          <a:chOff x="0" y="0"/>
+          <a:chExt cx="0" cy="0"/>
+        </a:xfrm>
+      </p:grpSpPr>
+      <p:sp>
+        <p:nvSpPr>
+          <p:cNvPr id="2" name="TextBox 1">
+            <a:extLst>
+              <a:ext uri="{FF2B5EF4-FFF2-40B4-BE49-F238E27FC236}">
+                <a16:creationId xmlns:a16="http://schemas.microsoft.com/office/drawing/2014/main" id="{E5263714-2E5E-4493-BEE6-6BC5D1695698}"/>
+              </a:ext>
+            </a:extLst>
+          </p:cNvPr>
+          <p:cNvSpPr txBox="1"/>
+          <p:nvPr/>
+        </p:nvSpPr>
+        <p:spPr>
+          <a:xfrm>
+            <a:off x="1095468" y="243883"/>
+            <a:ext cx="10462416" cy="646331"/>
+          </a:xfrm>
+          <a:prstGeom prst="rect">
+            <a:avLst/>
+          </a:prstGeom>
+          <a:noFill/>
+        </p:spPr>
+        <p:txBody>
+          <a:bodyPr wrap="none" rtlCol="0">
+            <a:spAutoFit/>
+          </a:bodyPr>
+          <a:lstStyle/>
+          <a:p>
+            <a:pPr algn="ctr"/>
+            <a:r>
+              <a:rPr lang="en-US" sz="3600" b="1" dirty="0" smtClean="0">
+                <a:solidFill>
+                  <a:srgbClr val="0070C0"/>
+                </a:solidFill>
+              </a:rPr>
+              <a:t>Demo video with vector with preliminary acquisitions</a:t>
+            </a:r>
+            <a:endParaRPr lang="en-US" sz="3600" b="1" dirty="0">
+              <a:solidFill>
+                <a:srgbClr val="0070C0"/>
+              </a:solidFill>
+            </a:endParaRPr>
+          </a:p>
+        </p:txBody>
+      </p:sp>
+    </p:spTree>
+    <p:extLst>
+      <p:ext uri="{BB962C8B-B14F-4D97-AF65-F5344CB8AC3E}">
+        <p14:creationId xmlns:p14="http://schemas.microsoft.com/office/powerpoint/2010/main" val="3388028977"/>
       </p:ext>
     </p:extLst>
   </p:cSld>
@@ -3207,21 +3370,6 @@
 </file>
 
 <file path=customXml/item1.xml><?xml version="1.0" encoding="utf-8"?>
-<p:properties xmlns:p="http://schemas.microsoft.com/office/2006/metadata/properties" xmlns:xsi="http://www.w3.org/2001/XMLSchema-instance" xmlns:pc="http://schemas.microsoft.com/office/infopath/2007/PartnerControls">
-  <documentManagement/>
-</p:properties>
-</file>
-
-<file path=customXml/item2.xml><?xml version="1.0" encoding="utf-8"?>
-<?mso-contentType ?>
-<FormTemplates xmlns="http://schemas.microsoft.com/sharepoint/v3/contenttype/forms">
-  <Display>DocumentLibraryForm</Display>
-  <Edit>DocumentLibraryForm</Edit>
-  <New>DocumentLibraryForm</New>
-</FormTemplates>
-</file>
-
-<file path=customXml/item3.xml><?xml version="1.0" encoding="utf-8"?>
 <ct:contentTypeSchema xmlns:ct="http://schemas.microsoft.com/office/2006/metadata/contentType" xmlns:ma="http://schemas.microsoft.com/office/2006/metadata/properties/metaAttributes" ct:_="" ma:_="" ma:contentTypeName="Documento" ma:contentTypeID="0x0101007C9E929CBD2E484F84BE867FC81D6F1D" ma:contentTypeVersion="14" ma:contentTypeDescription="Creare un nuovo documento." ma:contentTypeScope="" ma:versionID="61ad23b40e181a3f3494d0642231b264">
   <xsd:schema xmlns:xsd="http://www.w3.org/2001/XMLSchema" xmlns:xs="http://www.w3.org/2001/XMLSchema" xmlns:p="http://schemas.microsoft.com/office/2006/metadata/properties" xmlns:ns2="83c88cb7-92ec-4738-b55f-19dddbc2678d" xmlns:ns3="a9d2133a-30b9-46e4-a20a-9e90a26e7d6b" targetNamespace="http://schemas.microsoft.com/office/2006/metadata/properties" ma:root="true" ma:fieldsID="ce944e2dbaa109436b5cc39d0f123940" ns2:_="" ns3:_="">
     <xsd:import namespace="83c88cb7-92ec-4738-b55f-19dddbc2678d"/>
@@ -3444,32 +3592,22 @@
 </ct:contentTypeSchema>
 </file>
 
-<file path=customXml/itemProps1.xml><?xml version="1.0" encoding="utf-8"?>
-<ds:datastoreItem xmlns:ds="http://schemas.openxmlformats.org/officeDocument/2006/customXml" ds:itemID="{9ACC3CE8-C567-4D72-804F-FFEC711F513E}">
-  <ds:schemaRefs>
-    <ds:schemaRef ds:uri="http://schemas.microsoft.com/office/2006/documentManagement/types"/>
-    <ds:schemaRef ds:uri="http://purl.org/dc/elements/1.1/"/>
-    <ds:schemaRef ds:uri="http://schemas.microsoft.com/office/2006/metadata/properties"/>
-    <ds:schemaRef ds:uri="a9d2133a-30b9-46e4-a20a-9e90a26e7d6b"/>
-    <ds:schemaRef ds:uri="83c88cb7-92ec-4738-b55f-19dddbc2678d"/>
-    <ds:schemaRef ds:uri="http://purl.org/dc/terms/"/>
-    <ds:schemaRef ds:uri="http://schemas.openxmlformats.org/package/2006/metadata/core-properties"/>
-    <ds:schemaRef ds:uri="http://purl.org/dc/dcmitype/"/>
-    <ds:schemaRef ds:uri="http://schemas.microsoft.com/office/infopath/2007/PartnerControls"/>
-    <ds:schemaRef ds:uri="http://www.w3.org/XML/1998/namespace"/>
-  </ds:schemaRefs>
-</ds:datastoreItem>
+<file path=customXml/item2.xml><?xml version="1.0" encoding="utf-8"?>
+<?mso-contentType ?>
+<FormTemplates xmlns="http://schemas.microsoft.com/sharepoint/v3/contenttype/forms">
+  <Display>DocumentLibraryForm</Display>
+  <Edit>DocumentLibraryForm</Edit>
+  <New>DocumentLibraryForm</New>
+</FormTemplates>
 </file>
 
-<file path=customXml/itemProps2.xml><?xml version="1.0" encoding="utf-8"?>
-<ds:datastoreItem xmlns:ds="http://schemas.openxmlformats.org/officeDocument/2006/customXml" ds:itemID="{B04070C4-139B-4E40-A792-B668524D057A}">
-  <ds:schemaRefs>
-    <ds:schemaRef ds:uri="http://schemas.microsoft.com/sharepoint/v3/contenttype/forms"/>
-  </ds:schemaRefs>
-</ds:datastoreItem>
+<file path=customXml/item3.xml><?xml version="1.0" encoding="utf-8"?>
+<p:properties xmlns:p="http://schemas.microsoft.com/office/2006/metadata/properties" xmlns:xsi="http://www.w3.org/2001/XMLSchema-instance" xmlns:pc="http://schemas.microsoft.com/office/infopath/2007/PartnerControls">
+  <documentManagement/>
+</p:properties>
 </file>
 
-<file path=customXml/itemProps3.xml><?xml version="1.0" encoding="utf-8"?>
+<file path=customXml/itemProps1.xml><?xml version="1.0" encoding="utf-8"?>
 <ds:datastoreItem xmlns:ds="http://schemas.openxmlformats.org/officeDocument/2006/customXml" ds:itemID="{0C4427F6-166D-4A53-B70F-11B52B32F2F2}">
   <ds:schemaRefs>
     <ds:schemaRef ds:uri="http://schemas.microsoft.com/office/2006/metadata/contentType"/>
@@ -3486,4 +3624,29 @@
     <ds:schemaRef ds:uri="http://schemas.microsoft.com/internal/obd"/>
   </ds:schemaRefs>
 </ds:datastoreItem>
+</file>
+
+<file path=customXml/itemProps2.xml><?xml version="1.0" encoding="utf-8"?>
+<ds:datastoreItem xmlns:ds="http://schemas.openxmlformats.org/officeDocument/2006/customXml" ds:itemID="{B04070C4-139B-4E40-A792-B668524D057A}">
+  <ds:schemaRefs>
+    <ds:schemaRef ds:uri="http://schemas.microsoft.com/sharepoint/v3/contenttype/forms"/>
+  </ds:schemaRefs>
+</ds:datastoreItem>
+</file>
+
+<file path=customXml/itemProps3.xml><?xml version="1.0" encoding="utf-8"?>
+<ds:datastoreItem xmlns:ds="http://schemas.openxmlformats.org/officeDocument/2006/customXml" ds:itemID="{9ACC3CE8-C567-4D72-804F-FFEC711F513E}">
+  <ds:schemaRefs>
+    <ds:schemaRef ds:uri="http://schemas.microsoft.com/office/2006/documentManagement/types"/>
+    <ds:schemaRef ds:uri="http://purl.org/dc/elements/1.1/"/>
+    <ds:schemaRef ds:uri="http://schemas.microsoft.com/office/2006/metadata/properties"/>
+    <ds:schemaRef ds:uri="a9d2133a-30b9-46e4-a20a-9e90a26e7d6b"/>
+    <ds:schemaRef ds:uri="83c88cb7-92ec-4738-b55f-19dddbc2678d"/>
+    <ds:schemaRef ds:uri="http://purl.org/dc/terms/"/>
+    <ds:schemaRef ds:uri="http://schemas.openxmlformats.org/package/2006/metadata/core-properties"/>
+    <ds:schemaRef ds:uri="http://purl.org/dc/dcmitype/"/>
+    <ds:schemaRef ds:uri="http://schemas.microsoft.com/office/infopath/2007/PartnerControls"/>
+    <ds:schemaRef ds:uri="http://www.w3.org/XML/1998/namespace"/>
+  </ds:schemaRefs>
+</ds:datastoreItem>
 </file>
</xml_diff>